<commit_message>
Inflation prediction presentation slide
</commit_message>
<xml_diff>
--- a/Inflation_Prediction_Presentation v2.pptx
+++ b/Inflation_Prediction_Presentation v2.pptx
@@ -141,7 +141,7 @@
 <p1510:revInfo xmlns:a="http://schemas.openxmlformats.org/drawingml/2006/main" xmlns:r="http://schemas.openxmlformats.org/officeDocument/2006/relationships" xmlns:p1510="http://schemas.microsoft.com/office/powerpoint/2015/10/main">
   <p1510:revLst>
     <p1510:client id="{06CBEA6B-A74C-47D3-ADC7-36FB70618D40}" v="235" dt="2024-08-30T06:32:33.830"/>
-    <p1510:client id="{C0C04AB9-9DFC-4357-A6F0-5B8209E03BE5}" v="82" dt="2024-08-30T07:01:21.469"/>
+    <p1510:client id="{C0C04AB9-9DFC-4357-A6F0-5B8209E03BE5}" v="86" dt="2024-08-30T07:07:01.715"/>
   </p1510:revLst>
 </p1510:revInfo>
 </file>
@@ -19967,14 +19967,7 @@
                 <a:ea typeface="Calibri"/>
                 <a:cs typeface="Calibri"/>
               </a:rPr>
-              <a:t>Yusuf </a:t>
-            </a:r>
-            <a:r>
-              <a:rPr lang="en-US" dirty="0" err="1">
-                <a:ea typeface="Calibri"/>
-                <a:cs typeface="Calibri"/>
-              </a:rPr>
-              <a:t>Albdulhadi</a:t>
+              <a:t>Yusuf Abdulhadi</a:t>
             </a:r>
             <a:endParaRPr lang="en-US" dirty="0" err="1"/>
           </a:p>

</xml_diff>

<commit_message>
Inflation prediction presentation slides
</commit_message>
<xml_diff>
--- a/Inflation_Prediction_Presentation v2.pptx
+++ b/Inflation_Prediction_Presentation v2.pptx
@@ -141,7 +141,7 @@
 <p1510:revInfo xmlns:a="http://schemas.openxmlformats.org/drawingml/2006/main" xmlns:r="http://schemas.openxmlformats.org/officeDocument/2006/relationships" xmlns:p1510="http://schemas.microsoft.com/office/powerpoint/2015/10/main">
   <p1510:revLst>
     <p1510:client id="{06CBEA6B-A74C-47D3-ADC7-36FB70618D40}" v="235" dt="2024-08-30T06:32:33.830"/>
-    <p1510:client id="{C0C04AB9-9DFC-4357-A6F0-5B8209E03BE5}" v="86" dt="2024-08-30T07:07:01.715"/>
+    <p1510:client id="{C0C04AB9-9DFC-4357-A6F0-5B8209E03BE5}" v="90" dt="2024-08-30T07:09:33.727"/>
   </p1510:revLst>
 </p1510:revInfo>
 </file>
@@ -19901,18 +19901,11 @@
               </a:spcAft>
             </a:pPr>
             <a:r>
-              <a:rPr lang="en-US" dirty="0" err="1">
-                <a:ea typeface="Calibri"/>
-                <a:cs typeface="Calibri"/>
-              </a:rPr>
-              <a:t>Abudullahi</a:t>
-            </a:r>
-            <a:r>
               <a:rPr lang="en-US" dirty="0">
                 <a:ea typeface="Calibri"/>
                 <a:cs typeface="Calibri"/>
               </a:rPr>
-              <a:t> Sada</a:t>
+              <a:t>Abdullahi Sada</a:t>
             </a:r>
             <a:endParaRPr lang="en-US">
               <a:ea typeface="Calibri"/>

</xml_diff>